<commit_message>
ATO update version 0729
</commit_message>
<xml_diff>
--- a/Account Takeover/slide/presentation.pptx
+++ b/Account Takeover/slide/presentation.pptx
@@ -115,6 +115,11 @@
       </a:defRPr>
     </a:lvl9pPr>
   </p:defaultTextStyle>
+  <p:extLst>
+    <p:ext uri="{EFAFB233-063F-42B5-8137-9DF3F51BA10A}">
+      <p15:sldGuideLst xmlns:p15="http://schemas.microsoft.com/office/powerpoint/2012/main"/>
+    </p:ext>
+  </p:extLst>
 </p:presentation>
 </file>
 
@@ -2373,7 +2378,7 @@
           <a:p>
             <a:fld id="{CEC31ED4-C5E5-7147-82DD-0F76E9618B01}" type="datetimeFigureOut">
               <a:rPr lang="en-US" smtClean="0"/>
-              <a:t>7/21/22</a:t>
+              <a:t>7/26/22</a:t>
             </a:fld>
             <a:endParaRPr lang="en-US"/>
           </a:p>
@@ -2940,7 +2945,7 @@
           <a:p>
             <a:fld id="{579A109F-2D3F-9C4A-9D94-2A63D4BBDA5A}" type="datetimeFigureOut">
               <a:rPr lang="en-US" smtClean="0"/>
-              <a:t>7/21/22</a:t>
+              <a:t>7/26/22</a:t>
             </a:fld>
             <a:endParaRPr lang="en-US"/>
           </a:p>
@@ -3110,7 +3115,7 @@
           <a:p>
             <a:fld id="{579A109F-2D3F-9C4A-9D94-2A63D4BBDA5A}" type="datetimeFigureOut">
               <a:rPr lang="en-US" smtClean="0"/>
-              <a:t>7/21/22</a:t>
+              <a:t>7/26/22</a:t>
             </a:fld>
             <a:endParaRPr lang="en-US"/>
           </a:p>
@@ -3290,7 +3295,7 @@
           <a:p>
             <a:fld id="{579A109F-2D3F-9C4A-9D94-2A63D4BBDA5A}" type="datetimeFigureOut">
               <a:rPr lang="en-US" smtClean="0"/>
-              <a:t>7/21/22</a:t>
+              <a:t>7/26/22</a:t>
             </a:fld>
             <a:endParaRPr lang="en-US"/>
           </a:p>
@@ -5416,7 +5421,7 @@
           <a:p>
             <a:fld id="{579A109F-2D3F-9C4A-9D94-2A63D4BBDA5A}" type="datetimeFigureOut">
               <a:rPr lang="en-US" smtClean="0"/>
-              <a:t>7/21/22</a:t>
+              <a:t>7/26/22</a:t>
             </a:fld>
             <a:endParaRPr lang="en-US"/>
           </a:p>
@@ -6492,7 +6497,7 @@
           <a:graphicData uri="http://schemas.openxmlformats.org/presentationml/2006/ole">
             <mc:AlternateContent xmlns:mc="http://schemas.openxmlformats.org/markup-compatibility/2006">
               <mc:Choice xmlns:v="urn:schemas-microsoft-com:vml" Requires="v">
-                <p:oleObj spid="_x0000_s2050" name="think-cell Slide" r:id="rId4" imgW="7763510" imgH="10049510" progId="TCLayout.ActiveDocument.1">
+                <p:oleObj spid="_x0000_s2051" name="think-cell Slide" r:id="rId4" imgW="7763510" imgH="10049510" progId="TCLayout.ActiveDocument.1">
                   <p:embed/>
                 </p:oleObj>
               </mc:Choice>
@@ -6925,7 +6930,7 @@
           <a:p>
             <a:fld id="{C508AC19-0796-4750-A574-3F640E3F84BA}" type="datetimeFigureOut">
               <a:rPr lang="zh-CN" altLang="en-US" smtClean="0"/>
-              <a:t>2022/7/21</a:t>
+              <a:t>2022/7/26</a:t>
             </a:fld>
             <a:endParaRPr lang="zh-CN" altLang="en-US"/>
           </a:p>
@@ -7111,7 +7116,7 @@
           <a:p>
             <a:fld id="{C508AC19-0796-4750-A574-3F640E3F84BA}" type="datetimeFigureOut">
               <a:rPr lang="zh-CN" altLang="en-US" smtClean="0"/>
-              <a:t>2022/7/21</a:t>
+              <a:t>2022/7/26</a:t>
             </a:fld>
             <a:endParaRPr lang="zh-CN" altLang="en-US"/>
           </a:p>
@@ -7373,7 +7378,7 @@
           <a:p>
             <a:fld id="{C508AC19-0796-4750-A574-3F640E3F84BA}" type="datetimeFigureOut">
               <a:rPr lang="zh-CN" altLang="en-US" smtClean="0"/>
-              <a:t>2022/7/21</a:t>
+              <a:t>2022/7/26</a:t>
             </a:fld>
             <a:endParaRPr lang="zh-CN" altLang="en-US"/>
           </a:p>
@@ -7621,7 +7626,7 @@
           <a:p>
             <a:fld id="{C508AC19-0796-4750-A574-3F640E3F84BA}" type="datetimeFigureOut">
               <a:rPr lang="zh-CN" altLang="en-US" smtClean="0"/>
-              <a:t>2022/7/21</a:t>
+              <a:t>2022/7/26</a:t>
             </a:fld>
             <a:endParaRPr lang="zh-CN" altLang="en-US"/>
           </a:p>
@@ -8004,7 +8009,7 @@
           <a:p>
             <a:fld id="{C508AC19-0796-4750-A574-3F640E3F84BA}" type="datetimeFigureOut">
               <a:rPr lang="zh-CN" altLang="en-US" smtClean="0"/>
-              <a:t>2022/7/21</a:t>
+              <a:t>2022/7/26</a:t>
             </a:fld>
             <a:endParaRPr lang="zh-CN" altLang="en-US"/>
           </a:p>
@@ -8266,7 +8271,7 @@
           <a:p>
             <a:fld id="{579A109F-2D3F-9C4A-9D94-2A63D4BBDA5A}" type="datetimeFigureOut">
               <a:rPr lang="en-US" smtClean="0"/>
-              <a:t>7/21/22</a:t>
+              <a:t>7/26/22</a:t>
             </a:fld>
             <a:endParaRPr lang="en-US"/>
           </a:p>
@@ -8384,7 +8389,7 @@
           <a:p>
             <a:fld id="{C508AC19-0796-4750-A574-3F640E3F84BA}" type="datetimeFigureOut">
               <a:rPr lang="zh-CN" altLang="en-US" smtClean="0"/>
-              <a:t>2022/7/21</a:t>
+              <a:t>2022/7/26</a:t>
             </a:fld>
             <a:endParaRPr lang="zh-CN" altLang="en-US"/>
           </a:p>
@@ -8495,7 +8500,7 @@
           <a:p>
             <a:fld id="{C508AC19-0796-4750-A574-3F640E3F84BA}" type="datetimeFigureOut">
               <a:rPr lang="zh-CN" altLang="en-US" smtClean="0"/>
-              <a:t>2022/7/21</a:t>
+              <a:t>2022/7/26</a:t>
             </a:fld>
             <a:endParaRPr lang="zh-CN" altLang="en-US"/>
           </a:p>
@@ -8788,7 +8793,7 @@
           <a:p>
             <a:fld id="{C508AC19-0796-4750-A574-3F640E3F84BA}" type="datetimeFigureOut">
               <a:rPr lang="zh-CN" altLang="en-US" smtClean="0"/>
-              <a:t>2022/7/21</a:t>
+              <a:t>2022/7/26</a:t>
             </a:fld>
             <a:endParaRPr lang="zh-CN" altLang="en-US"/>
           </a:p>
@@ -9061,7 +9066,7 @@
           <a:p>
             <a:fld id="{C508AC19-0796-4750-A574-3F640E3F84BA}" type="datetimeFigureOut">
               <a:rPr lang="zh-CN" altLang="en-US" smtClean="0"/>
-              <a:t>2022/7/21</a:t>
+              <a:t>2022/7/26</a:t>
             </a:fld>
             <a:endParaRPr lang="zh-CN" altLang="en-US"/>
           </a:p>
@@ -9247,7 +9252,7 @@
           <a:p>
             <a:fld id="{C508AC19-0796-4750-A574-3F640E3F84BA}" type="datetimeFigureOut">
               <a:rPr lang="zh-CN" altLang="en-US" smtClean="0"/>
-              <a:t>2022/7/21</a:t>
+              <a:t>2022/7/26</a:t>
             </a:fld>
             <a:endParaRPr lang="zh-CN" altLang="en-US"/>
           </a:p>
@@ -9443,7 +9448,7 @@
           <a:p>
             <a:fld id="{C508AC19-0796-4750-A574-3F640E3F84BA}" type="datetimeFigureOut">
               <a:rPr lang="zh-CN" altLang="en-US" smtClean="0"/>
-              <a:t>2022/7/21</a:t>
+              <a:t>2022/7/26</a:t>
             </a:fld>
             <a:endParaRPr lang="zh-CN" altLang="en-US"/>
           </a:p>
@@ -10872,7 +10877,7 @@
           <a:p>
             <a:fld id="{579A109F-2D3F-9C4A-9D94-2A63D4BBDA5A}" type="datetimeFigureOut">
               <a:rPr lang="en-US" smtClean="0"/>
-              <a:t>7/21/22</a:t>
+              <a:t>7/26/22</a:t>
             </a:fld>
             <a:endParaRPr lang="en-US"/>
           </a:p>
@@ -12754,7 +12759,7 @@
           <a:graphicData uri="http://schemas.openxmlformats.org/presentationml/2006/ole">
             <mc:AlternateContent xmlns:mc="http://schemas.openxmlformats.org/markup-compatibility/2006">
               <mc:Choice xmlns:v="urn:schemas-microsoft-com:vml" Requires="v">
-                <p:oleObj spid="_x0000_s4098" name="think-cell Slide" r:id="rId4" imgW="7763510" imgH="10049510" progId="TCLayout.ActiveDocument.1">
+                <p:oleObj spid="_x0000_s4099" name="think-cell Slide" r:id="rId4" imgW="7763510" imgH="10049510" progId="TCLayout.ActiveDocument.1">
                   <p:embed/>
                 </p:oleObj>
               </mc:Choice>
@@ -13187,7 +13192,7 @@
           <a:p>
             <a:fld id="{579A109F-2D3F-9C4A-9D94-2A63D4BBDA5A}" type="datetimeFigureOut">
               <a:rPr lang="en-US" smtClean="0"/>
-              <a:t>7/21/22</a:t>
+              <a:t>7/26/22</a:t>
             </a:fld>
             <a:endParaRPr lang="en-US"/>
           </a:p>
@@ -13554,7 +13559,7 @@
           <a:p>
             <a:fld id="{579A109F-2D3F-9C4A-9D94-2A63D4BBDA5A}" type="datetimeFigureOut">
               <a:rPr lang="en-US" smtClean="0"/>
-              <a:t>7/21/22</a:t>
+              <a:t>7/26/22</a:t>
             </a:fld>
             <a:endParaRPr lang="en-US"/>
           </a:p>
@@ -13724,7 +13729,7 @@
           <a:p>
             <a:fld id="{579A109F-2D3F-9C4A-9D94-2A63D4BBDA5A}" type="datetimeFigureOut">
               <a:rPr lang="en-US" smtClean="0"/>
-              <a:t>7/21/22</a:t>
+              <a:t>7/26/22</a:t>
             </a:fld>
             <a:endParaRPr lang="en-US"/>
           </a:p>
@@ -13970,7 +13975,7 @@
           <a:p>
             <a:fld id="{579A109F-2D3F-9C4A-9D94-2A63D4BBDA5A}" type="datetimeFigureOut">
               <a:rPr lang="en-US" smtClean="0"/>
-              <a:t>7/21/22</a:t>
+              <a:t>7/26/22</a:t>
             </a:fld>
             <a:endParaRPr lang="en-US"/>
           </a:p>
@@ -14202,7 +14207,7 @@
           <a:p>
             <a:fld id="{579A109F-2D3F-9C4A-9D94-2A63D4BBDA5A}" type="datetimeFigureOut">
               <a:rPr lang="en-US" smtClean="0"/>
-              <a:t>7/21/22</a:t>
+              <a:t>7/26/22</a:t>
             </a:fld>
             <a:endParaRPr lang="en-US"/>
           </a:p>
@@ -14569,7 +14574,7 @@
           <a:p>
             <a:fld id="{579A109F-2D3F-9C4A-9D94-2A63D4BBDA5A}" type="datetimeFigureOut">
               <a:rPr lang="en-US" smtClean="0"/>
-              <a:t>7/21/22</a:t>
+              <a:t>7/26/22</a:t>
             </a:fld>
             <a:endParaRPr lang="en-US"/>
           </a:p>
@@ -14687,7 +14692,7 @@
           <a:p>
             <a:fld id="{579A109F-2D3F-9C4A-9D94-2A63D4BBDA5A}" type="datetimeFigureOut">
               <a:rPr lang="en-US" smtClean="0"/>
-              <a:t>7/21/22</a:t>
+              <a:t>7/26/22</a:t>
             </a:fld>
             <a:endParaRPr lang="en-US"/>
           </a:p>
@@ -14782,7 +14787,7 @@
           <a:p>
             <a:fld id="{579A109F-2D3F-9C4A-9D94-2A63D4BBDA5A}" type="datetimeFigureOut">
               <a:rPr lang="en-US" smtClean="0"/>
-              <a:t>7/21/22</a:t>
+              <a:t>7/26/22</a:t>
             </a:fld>
             <a:endParaRPr lang="en-US"/>
           </a:p>
@@ -15059,7 +15064,7 @@
           <a:p>
             <a:fld id="{579A109F-2D3F-9C4A-9D94-2A63D4BBDA5A}" type="datetimeFigureOut">
               <a:rPr lang="en-US" smtClean="0"/>
-              <a:t>7/21/22</a:t>
+              <a:t>7/26/22</a:t>
             </a:fld>
             <a:endParaRPr lang="en-US"/>
           </a:p>
@@ -15316,7 +15321,7 @@
           <a:p>
             <a:fld id="{579A109F-2D3F-9C4A-9D94-2A63D4BBDA5A}" type="datetimeFigureOut">
               <a:rPr lang="en-US" smtClean="0"/>
-              <a:t>7/21/22</a:t>
+              <a:t>7/26/22</a:t>
             </a:fld>
             <a:endParaRPr lang="en-US"/>
           </a:p>
@@ -15486,7 +15491,7 @@
           <a:p>
             <a:fld id="{579A109F-2D3F-9C4A-9D94-2A63D4BBDA5A}" type="datetimeFigureOut">
               <a:rPr lang="en-US" smtClean="0"/>
-              <a:t>7/21/22</a:t>
+              <a:t>7/26/22</a:t>
             </a:fld>
             <a:endParaRPr lang="en-US"/>
           </a:p>
@@ -15666,7 +15671,7 @@
           <a:p>
             <a:fld id="{579A109F-2D3F-9C4A-9D94-2A63D4BBDA5A}" type="datetimeFigureOut">
               <a:rPr lang="en-US" smtClean="0"/>
-              <a:t>7/21/22</a:t>
+              <a:t>7/26/22</a:t>
             </a:fld>
             <a:endParaRPr lang="en-US"/>
           </a:p>
@@ -15784,7 +15789,7 @@
           <a:p>
             <a:fld id="{579A109F-2D3F-9C4A-9D94-2A63D4BBDA5A}" type="datetimeFigureOut">
               <a:rPr lang="en-US" smtClean="0"/>
-              <a:t>7/21/22</a:t>
+              <a:t>7/26/22</a:t>
             </a:fld>
             <a:endParaRPr lang="en-US"/>
           </a:p>
@@ -18281,7 +18286,7 @@
           <a:p>
             <a:fld id="{579A109F-2D3F-9C4A-9D94-2A63D4BBDA5A}" type="datetimeFigureOut">
               <a:rPr lang="en-US" smtClean="0"/>
-              <a:t>7/21/22</a:t>
+              <a:t>7/26/22</a:t>
             </a:fld>
             <a:endParaRPr lang="en-US"/>
           </a:p>
@@ -18911,7 +18916,7 @@
           <a:graphicData uri="http://schemas.openxmlformats.org/presentationml/2006/ole">
             <mc:AlternateContent xmlns:mc="http://schemas.openxmlformats.org/markup-compatibility/2006">
               <mc:Choice xmlns:v="urn:schemas-microsoft-com:vml" Requires="v">
-                <p:oleObj spid="_x0000_s6146" name="think-cell Slide" r:id="rId4" imgW="7763510" imgH="10049510" progId="TCLayout.ActiveDocument.1">
+                <p:oleObj spid="_x0000_s6147" name="think-cell Slide" r:id="rId4" imgW="7763510" imgH="10049510" progId="TCLayout.ActiveDocument.1">
                   <p:embed/>
                 </p:oleObj>
               </mc:Choice>
@@ -19429,7 +19434,7 @@
           <a:p>
             <a:fld id="{579A109F-2D3F-9C4A-9D94-2A63D4BBDA5A}" type="datetimeFigureOut">
               <a:rPr lang="en-US" smtClean="0"/>
-              <a:t>7/21/22</a:t>
+              <a:t>7/26/22</a:t>
             </a:fld>
             <a:endParaRPr lang="en-US"/>
           </a:p>
@@ -19686,7 +19691,7 @@
           <a:p>
             <a:fld id="{579A109F-2D3F-9C4A-9D94-2A63D4BBDA5A}" type="datetimeFigureOut">
               <a:rPr lang="en-US" smtClean="0"/>
-              <a:t>7/21/22</a:t>
+              <a:t>7/26/22</a:t>
             </a:fld>
             <a:endParaRPr lang="en-US"/>
           </a:p>
@@ -19897,7 +19902,7 @@
           <a:p>
             <a:fld id="{579A109F-2D3F-9C4A-9D94-2A63D4BBDA5A}" type="datetimeFigureOut">
               <a:rPr lang="en-US" smtClean="0"/>
-              <a:t>7/21/22</a:t>
+              <a:t>7/26/22</a:t>
             </a:fld>
             <a:endParaRPr lang="en-US"/>
           </a:p>
@@ -20333,7 +20338,7 @@
           <a:graphicData uri="http://schemas.openxmlformats.org/presentationml/2006/ole">
             <mc:AlternateContent xmlns:mc="http://schemas.openxmlformats.org/markup-compatibility/2006">
               <mc:Choice xmlns:v="urn:schemas-microsoft-com:vml" Requires="v">
-                <p:oleObj spid="_x0000_s1026" name="think-cell Slide" r:id="rId14" imgW="0" imgH="0" progId="TCLayout.ActiveDocument.1">
+                <p:oleObj spid="_x0000_s1027" name="think-cell Slide" r:id="rId14" imgW="0" imgH="0" progId="TCLayout.ActiveDocument.1">
                   <p:embed/>
                 </p:oleObj>
               </mc:Choice>
@@ -21077,7 +21082,7 @@
           <a:p>
             <a:fld id="{579A109F-2D3F-9C4A-9D94-2A63D4BBDA5A}" type="datetimeFigureOut">
               <a:rPr lang="en-US" smtClean="0"/>
-              <a:t>7/21/22</a:t>
+              <a:t>7/26/22</a:t>
             </a:fld>
             <a:endParaRPr lang="en-US"/>
           </a:p>
@@ -21513,7 +21518,7 @@
           <a:graphicData uri="http://schemas.openxmlformats.org/presentationml/2006/ole">
             <mc:AlternateContent xmlns:mc="http://schemas.openxmlformats.org/markup-compatibility/2006">
               <mc:Choice xmlns:v="urn:schemas-microsoft-com:vml" Requires="v">
-                <p:oleObj spid="_x0000_s3074" name="think-cell Slide" r:id="rId14" imgW="0" imgH="0" progId="TCLayout.ActiveDocument.1">
+                <p:oleObj spid="_x0000_s3075" name="think-cell Slide" r:id="rId14" imgW="0" imgH="0" progId="TCLayout.ActiveDocument.1">
                   <p:embed/>
                 </p:oleObj>
               </mc:Choice>
@@ -22257,7 +22262,7 @@
           <a:p>
             <a:fld id="{579A109F-2D3F-9C4A-9D94-2A63D4BBDA5A}" type="datetimeFigureOut">
               <a:rPr lang="en-US" smtClean="0"/>
-              <a:t>7/21/22</a:t>
+              <a:t>7/26/22</a:t>
             </a:fld>
             <a:endParaRPr lang="en-US"/>
           </a:p>
@@ -22693,7 +22698,7 @@
           <a:graphicData uri="http://schemas.openxmlformats.org/presentationml/2006/ole">
             <mc:AlternateContent xmlns:mc="http://schemas.openxmlformats.org/markup-compatibility/2006">
               <mc:Choice xmlns:v="urn:schemas-microsoft-com:vml" Requires="v">
-                <p:oleObj spid="_x0000_s5122" name="think-cell Slide" r:id="rId14" imgW="0" imgH="0" progId="TCLayout.ActiveDocument.1">
+                <p:oleObj spid="_x0000_s5123" name="think-cell Slide" r:id="rId14" imgW="0" imgH="0" progId="TCLayout.ActiveDocument.1">
                   <p:embed/>
                 </p:oleObj>
               </mc:Choice>

</xml_diff>